<commit_message>
updated powerpoint and domain doc
</commit_message>
<xml_diff>
--- a/DomainTrack/Domain Track Presentation.pptx
+++ b/DomainTrack/Domain Track Presentation.pptx
@@ -350,7 +350,7 @@
           <a:p>
             <a:fld id="{B2178C27-B2CA-44F3-AC92-7B92AF63F875}" type="datetimeFigureOut">
               <a:rPr lang="en-US" smtClean="0"/>
-              <a:t>5/8/2013</a:t>
+              <a:t>5/9/2013</a:t>
             </a:fld>
             <a:endParaRPr lang="en-US"/>
           </a:p>
@@ -628,7 +628,7 @@
           <a:p>
             <a:fld id="{B2178C27-B2CA-44F3-AC92-7B92AF63F875}" type="datetimeFigureOut">
               <a:rPr lang="en-US" smtClean="0"/>
-              <a:t>5/8/2013</a:t>
+              <a:t>5/9/2013</a:t>
             </a:fld>
             <a:endParaRPr lang="en-US"/>
           </a:p>
@@ -851,7 +851,7 @@
           <a:p>
             <a:fld id="{B2178C27-B2CA-44F3-AC92-7B92AF63F875}" type="datetimeFigureOut">
               <a:rPr lang="en-US" smtClean="0"/>
-              <a:t>5/8/2013</a:t>
+              <a:t>5/9/2013</a:t>
             </a:fld>
             <a:endParaRPr lang="en-US"/>
           </a:p>
@@ -1046,7 +1046,7 @@
           <a:p>
             <a:fld id="{B2178C27-B2CA-44F3-AC92-7B92AF63F875}" type="datetimeFigureOut">
               <a:rPr lang="en-US" smtClean="0"/>
-              <a:t>5/8/2013</a:t>
+              <a:t>5/9/2013</a:t>
             </a:fld>
             <a:endParaRPr lang="en-US"/>
           </a:p>
@@ -1375,7 +1375,7 @@
           <a:p>
             <a:fld id="{B2178C27-B2CA-44F3-AC92-7B92AF63F875}" type="datetimeFigureOut">
               <a:rPr lang="en-US" smtClean="0"/>
-              <a:t>5/8/2013</a:t>
+              <a:t>5/9/2013</a:t>
             </a:fld>
             <a:endParaRPr lang="en-US"/>
           </a:p>
@@ -1848,7 +1848,7 @@
           <a:p>
             <a:fld id="{B2178C27-B2CA-44F3-AC92-7B92AF63F875}" type="datetimeFigureOut">
               <a:rPr lang="en-US" smtClean="0"/>
-              <a:t>5/8/2013</a:t>
+              <a:t>5/9/2013</a:t>
             </a:fld>
             <a:endParaRPr lang="en-US"/>
           </a:p>
@@ -2303,7 +2303,7 @@
           <a:p>
             <a:fld id="{B2178C27-B2CA-44F3-AC92-7B92AF63F875}" type="datetimeFigureOut">
               <a:rPr lang="en-US" smtClean="0"/>
-              <a:t>5/8/2013</a:t>
+              <a:t>5/9/2013</a:t>
             </a:fld>
             <a:endParaRPr lang="en-US"/>
           </a:p>
@@ -2441,7 +2441,7 @@
           <a:p>
             <a:fld id="{B2178C27-B2CA-44F3-AC92-7B92AF63F875}" type="datetimeFigureOut">
               <a:rPr lang="en-US" smtClean="0"/>
-              <a:t>5/8/2013</a:t>
+              <a:t>5/9/2013</a:t>
             </a:fld>
             <a:endParaRPr lang="en-US"/>
           </a:p>
@@ -2602,7 +2602,7 @@
           <a:p>
             <a:fld id="{B2178C27-B2CA-44F3-AC92-7B92AF63F875}" type="datetimeFigureOut">
               <a:rPr lang="en-US" smtClean="0"/>
-              <a:t>5/8/2013</a:t>
+              <a:t>5/9/2013</a:t>
             </a:fld>
             <a:endParaRPr lang="en-US"/>
           </a:p>
@@ -2996,7 +2996,7 @@
           <a:p>
             <a:fld id="{B2178C27-B2CA-44F3-AC92-7B92AF63F875}" type="datetimeFigureOut">
               <a:rPr lang="en-US" smtClean="0"/>
-              <a:t>5/8/2013</a:t>
+              <a:t>5/9/2013</a:t>
             </a:fld>
             <a:endParaRPr lang="en-US"/>
           </a:p>
@@ -3396,7 +3396,7 @@
           <a:p>
             <a:fld id="{B2178C27-B2CA-44F3-AC92-7B92AF63F875}" type="datetimeFigureOut">
               <a:rPr lang="en-US" smtClean="0"/>
-              <a:t>5/8/2013</a:t>
+              <a:t>5/9/2013</a:t>
             </a:fld>
             <a:endParaRPr lang="en-US"/>
           </a:p>
@@ -3606,7 +3606,7 @@
           <a:p>
             <a:fld id="{B2178C27-B2CA-44F3-AC92-7B92AF63F875}" type="datetimeFigureOut">
               <a:rPr lang="en-US" smtClean="0"/>
-              <a:t>5/8/2013</a:t>
+              <a:t>5/9/2013</a:t>
             </a:fld>
             <a:endParaRPr lang="en-US"/>
           </a:p>
@@ -4328,7 +4328,23 @@
           <a:bodyPr/>
           <a:lstStyle/>
           <a:p>
-            <a:endParaRPr lang="en-US"/>
+            <a:r>
+              <a:rPr lang="en-US" dirty="0" smtClean="0"/>
+              <a:t>Visual aesthetic</a:t>
+            </a:r>
+          </a:p>
+          <a:p>
+            <a:r>
+              <a:rPr lang="en-US" dirty="0" smtClean="0"/>
+              <a:t>Resolution</a:t>
+            </a:r>
+          </a:p>
+          <a:p>
+            <a:r>
+              <a:rPr lang="en-US" dirty="0" smtClean="0"/>
+              <a:t>Performance</a:t>
+            </a:r>
+            <a:endParaRPr lang="en-US" dirty="0"/>
           </a:p>
         </p:txBody>
       </p:sp>
@@ -4400,7 +4416,38 @@
           <a:bodyPr/>
           <a:lstStyle/>
           <a:p>
-            <a:endParaRPr lang="en-US"/>
+            <a:r>
+              <a:rPr lang="en-US" dirty="0" smtClean="0"/>
+              <a:t>Rendering Algorithms</a:t>
+            </a:r>
+          </a:p>
+          <a:p>
+            <a:r>
+              <a:rPr lang="en-US" dirty="0"/>
+              <a:t>	</a:t>
+            </a:r>
+            <a:r>
+              <a:rPr lang="en-US" dirty="0" smtClean="0"/>
+              <a:t>Ray tracing</a:t>
+            </a:r>
+          </a:p>
+          <a:p>
+            <a:r>
+              <a:rPr lang="en-US" dirty="0"/>
+              <a:t>	</a:t>
+            </a:r>
+            <a:r>
+              <a:rPr lang="en-US" dirty="0" err="1" smtClean="0"/>
+              <a:t>Radiosity</a:t>
+            </a:r>
+            <a:endParaRPr lang="en-US" dirty="0" smtClean="0"/>
+          </a:p>
+          <a:p>
+            <a:r>
+              <a:rPr lang="en-US" dirty="0" smtClean="0"/>
+              <a:t>Hardware</a:t>
+            </a:r>
+            <a:endParaRPr lang="en-US" dirty="0"/>
           </a:p>
         </p:txBody>
       </p:sp>
@@ -4472,7 +4519,27 @@
           <a:bodyPr/>
           <a:lstStyle/>
           <a:p>
-            <a:endParaRPr lang="en-US"/>
+            <a:r>
+              <a:rPr lang="en-US" dirty="0" smtClean="0"/>
+              <a:t>Tracking resolution and frame rate</a:t>
+            </a:r>
+          </a:p>
+          <a:p>
+            <a:r>
+              <a:rPr lang="en-US" dirty="0" smtClean="0"/>
+              <a:t>Customer feedback</a:t>
+            </a:r>
+          </a:p>
+          <a:p>
+            <a:r>
+              <a:rPr lang="en-US" dirty="0"/>
+              <a:t>	</a:t>
+            </a:r>
+            <a:r>
+              <a:rPr lang="en-US" dirty="0" smtClean="0"/>
+              <a:t>Beta releases</a:t>
+            </a:r>
+            <a:endParaRPr lang="en-US" dirty="0" smtClean="0"/>
           </a:p>
         </p:txBody>
       </p:sp>
@@ -4742,25 +4809,6 @@
       </p:grpSpPr>
       <p:sp>
         <p:nvSpPr>
-          <p:cNvPr id="2" name="Content Placeholder 1"/>
-          <p:cNvSpPr>
-            <a:spLocks noGrp="1"/>
-          </p:cNvSpPr>
-          <p:nvPr>
-            <p:ph sz="quarter" idx="13"/>
-          </p:nvPr>
-        </p:nvSpPr>
-        <p:spPr/>
-        <p:txBody>
-          <a:bodyPr/>
-          <a:lstStyle/>
-          <a:p>
-            <a:endParaRPr lang="en-US"/>
-          </a:p>
-        </p:txBody>
-      </p:sp>
-      <p:sp>
-        <p:nvSpPr>
           <p:cNvPr id="3" name="Title 2"/>
           <p:cNvSpPr>
             <a:spLocks noGrp="1"/>
@@ -4782,6 +4830,111 @@
           </a:p>
         </p:txBody>
       </p:sp>
+      <p:pic>
+        <p:nvPicPr>
+          <p:cNvPr id="1028" name="Picture 4" descr="The Elder Scrolls V Skyrim cover.png"/>
+          <p:cNvPicPr>
+            <a:picLocks noChangeAspect="1" noChangeArrowheads="1"/>
+          </p:cNvPicPr>
+          <p:nvPr/>
+        </p:nvPicPr>
+        <p:blipFill>
+          <a:blip r:embed="rId2">
+            <a:extLst>
+              <a:ext uri="{28A0092B-C50C-407E-A947-70E740481C1C}">
+                <a14:useLocalDpi xmlns:a14="http://schemas.microsoft.com/office/drawing/2010/main" val="0"/>
+              </a:ext>
+            </a:extLst>
+          </a:blip>
+          <a:srcRect/>
+          <a:stretch>
+            <a:fillRect/>
+          </a:stretch>
+        </p:blipFill>
+        <p:spPr bwMode="auto">
+          <a:xfrm>
+            <a:off x="5029200" y="1526071"/>
+            <a:ext cx="3557151" cy="4866183"/>
+          </a:xfrm>
+          <a:prstGeom prst="rect">
+            <a:avLst/>
+          </a:prstGeom>
+          <a:noFill/>
+          <a:extLst>
+            <a:ext uri="{909E8E84-426E-40DD-AFC4-6F175D3DCCD1}">
+              <a14:hiddenFill xmlns:a14="http://schemas.microsoft.com/office/drawing/2010/main">
+                <a:solidFill>
+                  <a:srgbClr val="FFFFFF"/>
+                </a:solidFill>
+              </a14:hiddenFill>
+            </a:ext>
+          </a:extLst>
+        </p:spPr>
+      </p:pic>
+      <p:pic>
+        <p:nvPicPr>
+          <p:cNvPr id="1030" name="Picture 6"/>
+          <p:cNvPicPr>
+            <a:picLocks noChangeAspect="1" noChangeArrowheads="1"/>
+          </p:cNvPicPr>
+          <p:nvPr/>
+        </p:nvPicPr>
+        <p:blipFill>
+          <a:blip r:embed="rId3">
+            <a:extLst>
+              <a:ext uri="{28A0092B-C50C-407E-A947-70E740481C1C}">
+                <a14:useLocalDpi xmlns:a14="http://schemas.microsoft.com/office/drawing/2010/main" val="0"/>
+              </a:ext>
+            </a:extLst>
+          </a:blip>
+          <a:srcRect/>
+          <a:stretch>
+            <a:fillRect/>
+          </a:stretch>
+        </p:blipFill>
+        <p:spPr bwMode="auto">
+          <a:xfrm>
+            <a:off x="574273" y="1526071"/>
+            <a:ext cx="3769127" cy="4866183"/>
+          </a:xfrm>
+          <a:prstGeom prst="rect">
+            <a:avLst/>
+          </a:prstGeom>
+          <a:noFill/>
+          <a:ln>
+            <a:noFill/>
+          </a:ln>
+          <a:effectLst/>
+          <a:extLst>
+            <a:ext uri="{909E8E84-426E-40DD-AFC4-6F175D3DCCD1}">
+              <a14:hiddenFill xmlns:a14="http://schemas.microsoft.com/office/drawing/2010/main">
+                <a:solidFill>
+                  <a:schemeClr val="accent1"/>
+                </a:solidFill>
+              </a14:hiddenFill>
+            </a:ext>
+            <a:ext uri="{91240B29-F687-4F45-9708-019B960494DF}">
+              <a14:hiddenLine xmlns:a14="http://schemas.microsoft.com/office/drawing/2010/main" w="9525">
+                <a:solidFill>
+                  <a:schemeClr val="tx1"/>
+                </a:solidFill>
+                <a:miter lim="800000"/>
+                <a:headEnd/>
+                <a:tailEnd/>
+              </a14:hiddenLine>
+            </a:ext>
+            <a:ext uri="{AF507438-7753-43E0-B8FC-AC1667EBCBE1}">
+              <a14:hiddenEffects xmlns:a14="http://schemas.microsoft.com/office/drawing/2010/main">
+                <a:effectLst>
+                  <a:outerShdw dist="35921" dir="2700000" algn="ctr" rotWithShape="0">
+                    <a:schemeClr val="bg2"/>
+                  </a:outerShdw>
+                </a:effectLst>
+              </a14:hiddenEffects>
+            </a:ext>
+          </a:extLst>
+        </p:spPr>
+      </p:pic>
     </p:spTree>
     <p:extLst>
       <p:ext uri="{BB962C8B-B14F-4D97-AF65-F5344CB8AC3E}">
@@ -4814,25 +4967,6 @@
       </p:grpSpPr>
       <p:sp>
         <p:nvSpPr>
-          <p:cNvPr id="2" name="Content Placeholder 1"/>
-          <p:cNvSpPr>
-            <a:spLocks noGrp="1"/>
-          </p:cNvSpPr>
-          <p:nvPr>
-            <p:ph sz="quarter" idx="13"/>
-          </p:nvPr>
-        </p:nvSpPr>
-        <p:spPr/>
-        <p:txBody>
-          <a:bodyPr/>
-          <a:lstStyle/>
-          <a:p>
-            <a:endParaRPr lang="en-US"/>
-          </a:p>
-        </p:txBody>
-      </p:sp>
-      <p:sp>
-        <p:nvSpPr>
           <p:cNvPr id="3" name="Title 2"/>
           <p:cNvSpPr>
             <a:spLocks noGrp="1"/>
@@ -4854,6 +4988,60 @@
           </a:p>
         </p:txBody>
       </p:sp>
+      <p:pic>
+        <p:nvPicPr>
+          <p:cNvPr id="2050" name="Picture 2"/>
+          <p:cNvPicPr>
+            <a:picLocks noChangeAspect="1" noChangeArrowheads="1"/>
+          </p:cNvPicPr>
+          <p:nvPr/>
+        </p:nvPicPr>
+        <p:blipFill>
+          <a:blip r:embed="rId2">
+            <a:extLst>
+              <a:ext uri="{28A0092B-C50C-407E-A947-70E740481C1C}">
+                <a14:useLocalDpi xmlns:a14="http://schemas.microsoft.com/office/drawing/2010/main" val="0"/>
+              </a:ext>
+            </a:extLst>
+          </a:blip>
+          <a:srcRect/>
+          <a:stretch>
+            <a:fillRect/>
+          </a:stretch>
+        </p:blipFill>
+        <p:spPr bwMode="auto">
+          <a:xfrm>
+            <a:off x="685800" y="1371600"/>
+            <a:ext cx="3502674" cy="4953000"/>
+          </a:xfrm>
+          <a:prstGeom prst="rect">
+            <a:avLst/>
+          </a:prstGeom>
+          <a:noFill/>
+          <a:ln>
+            <a:noFill/>
+          </a:ln>
+          <a:extLst>
+            <a:ext uri="{909E8E84-426E-40DD-AFC4-6F175D3DCCD1}">
+              <a14:hiddenFill xmlns:a14="http://schemas.microsoft.com/office/drawing/2010/main">
+                <a:solidFill>
+                  <a:schemeClr val="accent1"/>
+                </a:solidFill>
+              </a14:hiddenFill>
+            </a:ext>
+            <a:ext uri="{91240B29-F687-4F45-9708-019B960494DF}">
+              <a14:hiddenLine xmlns:a14="http://schemas.microsoft.com/office/drawing/2010/main" w="9525">
+                <a:solidFill>
+                  <a:schemeClr val="tx1"/>
+                </a:solidFill>
+                <a:miter lim="800000"/>
+                <a:headEnd/>
+                <a:tailEnd/>
+              </a14:hiddenLine>
+            </a:ext>
+          </a:extLst>
+        </p:spPr>
+      </p:pic>
     </p:spTree>
     <p:extLst>
       <p:ext uri="{BB962C8B-B14F-4D97-AF65-F5344CB8AC3E}">

</xml_diff>